<commit_message>
Expanded readme and slides
</commit_message>
<xml_diff>
--- a/StanleyX Hackathon.pptx
+++ b/StanleyX Hackathon.pptx
@@ -12,6 +12,7 @@
     <p:sldId id="257" r:id="rId7"/>
     <p:sldId id="258" r:id="rId8"/>
     <p:sldId id="259" r:id="rId9"/>
+    <p:sldId id="260" r:id="rId10"/>
   </p:sldIdLst>
   <p:sldSz cy="5143500" cx="9144000"/>
   <p:notesSz cx="6858000" cy="9144000"/>
@@ -1041,6 +1042,105 @@
       <p:sp>
         <p:nvSpPr>
           <p:cNvPr id="75" name="Google Shape;75;ge754d40173_0_2:notes"/>
+          <p:cNvSpPr txBox="1"/>
+          <p:nvPr>
+            <p:ph idx="1" type="body"/>
+          </p:nvPr>
+        </p:nvSpPr>
+        <p:spPr>
+          <a:xfrm>
+            <a:off x="685800" y="4343400"/>
+            <a:ext cx="5486400" cy="4114800"/>
+          </a:xfrm>
+          <a:prstGeom prst="rect">
+            <a:avLst/>
+          </a:prstGeom>
+        </p:spPr>
+        <p:txBody>
+          <a:bodyPr anchorCtr="0" anchor="t" bIns="91425" lIns="91425" spcFirstLastPara="1" rIns="91425" wrap="square" tIns="91425">
+            <a:noAutofit/>
+          </a:bodyPr>
+          <a:lstStyle/>
+          <a:p>
+            <a:pPr indent="0" lvl="0" marL="0" rtl="0" algn="l">
+              <a:spcBef>
+                <a:spcPts val="0"/>
+              </a:spcBef>
+              <a:spcAft>
+                <a:spcPts val="0"/>
+              </a:spcAft>
+              <a:buNone/>
+            </a:pPr>
+            <a:r>
+              <a:t/>
+            </a:r>
+            <a:endParaRPr/>
+          </a:p>
+        </p:txBody>
+      </p:sp>
+    </p:spTree>
+  </p:cSld>
+  <p:clrMapOvr>
+    <a:masterClrMapping/>
+  </p:clrMapOvr>
+</p:notes>
+</file>
+
+<file path=ppt/notesSlides/notesSlide5.xml><?xml version="1.0" encoding="utf-8"?>
+<p:notes xmlns:a="http://schemas.openxmlformats.org/drawingml/2006/main" xmlns:r="http://schemas.openxmlformats.org/officeDocument/2006/relationships" xmlns:mc="http://schemas.openxmlformats.org/markup-compatibility/2006" xmlns:mv="urn:schemas-microsoft-com:mac:vml" xmlns:p="http://schemas.openxmlformats.org/presentationml/2006/main" xmlns:c="http://schemas.openxmlformats.org/drawingml/2006/chart" xmlns:dgm="http://schemas.openxmlformats.org/drawingml/2006/diagram" xmlns:o="urn:schemas-microsoft-com:office:office" xmlns:v="urn:schemas-microsoft-com:vml" xmlns:pvml="urn:schemas-microsoft-com:office:powerpoint" xmlns:com="http://schemas.openxmlformats.org/drawingml/2006/compatibility" xmlns:p14="http://schemas.microsoft.com/office/powerpoint/2010/main" xmlns:p15="http://schemas.microsoft.com/office/powerpoint/2012/main" xmlns:ahyp="http://schemas.microsoft.com/office/drawing/2018/hyperlinkcolor" showMasterPhAnim="0" showMasterSp="0">
+  <p:cSld>
+    <p:spTree>
+      <p:nvGrpSpPr>
+        <p:cNvPr id="79" name="Shape 79"/>
+        <p:cNvGrpSpPr/>
+        <p:nvPr/>
+      </p:nvGrpSpPr>
+      <p:grpSpPr>
+        <a:xfrm>
+          <a:off x="0" y="0"/>
+          <a:ext cx="0" cy="0"/>
+          <a:chOff x="0" y="0"/>
+          <a:chExt cx="0" cy="0"/>
+        </a:xfrm>
+      </p:grpSpPr>
+      <p:sp>
+        <p:nvSpPr>
+          <p:cNvPr id="80" name="Google Shape;80;ge7d56ed7de_0_0:notes"/>
+          <p:cNvSpPr/>
+          <p:nvPr>
+            <p:ph idx="2" type="sldImg"/>
+          </p:nvPr>
+        </p:nvSpPr>
+        <p:spPr>
+          <a:xfrm>
+            <a:off x="381300" y="685800"/>
+            <a:ext cx="6096000" cy="3429000"/>
+          </a:xfrm>
+          <a:custGeom>
+            <a:rect b="b" l="l" r="r" t="t"/>
+            <a:pathLst>
+              <a:path extrusionOk="0" h="120000" w="120000">
+                <a:moveTo>
+                  <a:pt x="0" y="0"/>
+                </a:moveTo>
+                <a:lnTo>
+                  <a:pt x="120000" y="0"/>
+                </a:lnTo>
+                <a:lnTo>
+                  <a:pt x="120000" y="120000"/>
+                </a:lnTo>
+                <a:lnTo>
+                  <a:pt x="0" y="120000"/>
+                </a:lnTo>
+                <a:close/>
+              </a:path>
+            </a:pathLst>
+          </a:custGeom>
+        </p:spPr>
+      </p:sp>
+      <p:sp>
+        <p:nvSpPr>
+          <p:cNvPr id="81" name="Google Shape;81;ge7d56ed7de_0_0:notes"/>
           <p:cNvSpPr txBox="1"/>
           <p:nvPr>
             <p:ph idx="1" type="body"/>
@@ -6821,7 +6921,7 @@
         </p:spPr>
         <p:txBody>
           <a:bodyPr anchorCtr="0" anchor="t" bIns="91425" lIns="91425" spcFirstLastPara="1" rIns="91425" wrap="square" tIns="91425">
-            <a:normAutofit fontScale="92500" lnSpcReduction="10000"/>
+            <a:normAutofit fontScale="92500" lnSpcReduction="20000"/>
           </a:bodyPr>
           <a:lstStyle/>
           <a:p>
@@ -6954,6 +7054,23 @@
             </a:pPr>
             <a:r>
               <a:rPr lang="en"/>
+              <a:t>Workspace mapping to capture spatial arrangement of equipment</a:t>
+            </a:r>
+            <a:endParaRPr/>
+          </a:p>
+          <a:p>
+            <a:pPr indent="-334327" lvl="0" marL="457200" rtl="0" algn="l">
+              <a:spcBef>
+                <a:spcPts val="0"/>
+              </a:spcBef>
+              <a:spcAft>
+                <a:spcPts val="0"/>
+              </a:spcAft>
+              <a:buSzPct val="100000"/>
+              <a:buChar char="●"/>
+            </a:pPr>
+            <a:r>
+              <a:rPr lang="en"/>
               <a:t>Reward system (gamification) to encourage positive contribution and discourage spam</a:t>
             </a:r>
             <a:endParaRPr/>
@@ -6989,6 +7106,178 @@
             <a:r>
               <a:rPr lang="en"/>
               <a:t>Credentials automatically unlock access to machines that require safety training</a:t>
+            </a:r>
+            <a:endParaRPr/>
+          </a:p>
+        </p:txBody>
+      </p:sp>
+    </p:spTree>
+  </p:cSld>
+  <p:clrMapOvr>
+    <a:masterClrMapping/>
+  </p:clrMapOvr>
+</p:sld>
+</file>
+
+<file path=ppt/slides/slide5.xml><?xml version="1.0" encoding="utf-8"?>
+<p:sld xmlns:a="http://schemas.openxmlformats.org/drawingml/2006/main" xmlns:r="http://schemas.openxmlformats.org/officeDocument/2006/relationships" xmlns:mc="http://schemas.openxmlformats.org/markup-compatibility/2006" xmlns:mv="urn:schemas-microsoft-com:mac:vml" xmlns:p="http://schemas.openxmlformats.org/presentationml/2006/main" xmlns:c="http://schemas.openxmlformats.org/drawingml/2006/chart" xmlns:dgm="http://schemas.openxmlformats.org/drawingml/2006/diagram" xmlns:o="urn:schemas-microsoft-com:office:office" xmlns:v="urn:schemas-microsoft-com:vml" xmlns:pvml="urn:schemas-microsoft-com:office:powerpoint" xmlns:com="http://schemas.openxmlformats.org/drawingml/2006/compatibility" xmlns:p14="http://schemas.microsoft.com/office/powerpoint/2010/main" xmlns:p15="http://schemas.microsoft.com/office/powerpoint/2012/main" xmlns:ahyp="http://schemas.microsoft.com/office/drawing/2018/hyperlinkcolor">
+  <p:cSld>
+    <p:spTree>
+      <p:nvGrpSpPr>
+        <p:cNvPr id="82" name="Shape 82"/>
+        <p:cNvGrpSpPr/>
+        <p:nvPr/>
+      </p:nvGrpSpPr>
+      <p:grpSpPr>
+        <a:xfrm>
+          <a:off x="0" y="0"/>
+          <a:ext cx="0" cy="0"/>
+          <a:chOff x="0" y="0"/>
+          <a:chExt cx="0" cy="0"/>
+        </a:xfrm>
+      </p:grpSpPr>
+      <p:sp>
+        <p:nvSpPr>
+          <p:cNvPr id="83" name="Google Shape;83;p17"/>
+          <p:cNvSpPr txBox="1"/>
+          <p:nvPr>
+            <p:ph type="title"/>
+          </p:nvPr>
+        </p:nvSpPr>
+        <p:spPr>
+          <a:xfrm>
+            <a:off x="311700" y="445025"/>
+            <a:ext cx="8520600" cy="572700"/>
+          </a:xfrm>
+          <a:prstGeom prst="rect">
+            <a:avLst/>
+          </a:prstGeom>
+        </p:spPr>
+        <p:txBody>
+          <a:bodyPr anchorCtr="0" anchor="t" bIns="91425" lIns="91425" spcFirstLastPara="1" rIns="91425" wrap="square" tIns="91425">
+            <a:normAutofit fontScale="90000"/>
+          </a:bodyPr>
+          <a:lstStyle/>
+          <a:p>
+            <a:pPr indent="0" lvl="0" marL="0" rtl="0" algn="l">
+              <a:spcBef>
+                <a:spcPts val="0"/>
+              </a:spcBef>
+              <a:spcAft>
+                <a:spcPts val="0"/>
+              </a:spcAft>
+              <a:buNone/>
+            </a:pPr>
+            <a:r>
+              <a:rPr lang="en"/>
+              <a:t>Constraints and Known Issues</a:t>
+            </a:r>
+            <a:endParaRPr/>
+          </a:p>
+        </p:txBody>
+      </p:sp>
+      <p:sp>
+        <p:nvSpPr>
+          <p:cNvPr id="84" name="Google Shape;84;p17"/>
+          <p:cNvSpPr txBox="1"/>
+          <p:nvPr>
+            <p:ph idx="1" type="body"/>
+          </p:nvPr>
+        </p:nvSpPr>
+        <p:spPr>
+          <a:xfrm>
+            <a:off x="311700" y="1152475"/>
+            <a:ext cx="8520600" cy="3416400"/>
+          </a:xfrm>
+          <a:prstGeom prst="rect">
+            <a:avLst/>
+          </a:prstGeom>
+        </p:spPr>
+        <p:txBody>
+          <a:bodyPr anchorCtr="0" anchor="t" bIns="91425" lIns="91425" spcFirstLastPara="1" rIns="91425" wrap="square" tIns="91425">
+            <a:normAutofit/>
+          </a:bodyPr>
+          <a:lstStyle/>
+          <a:p>
+            <a:pPr indent="0" lvl="0" marL="0" rtl="0" algn="l">
+              <a:spcBef>
+                <a:spcPts val="0"/>
+              </a:spcBef>
+              <a:spcAft>
+                <a:spcPts val="0"/>
+              </a:spcAft>
+              <a:buNone/>
+            </a:pPr>
+            <a:r>
+              <a:rPr lang="en"/>
+              <a:t>Constraints</a:t>
+            </a:r>
+            <a:endParaRPr/>
+          </a:p>
+          <a:p>
+            <a:pPr indent="-342900" lvl="0" marL="457200" rtl="0" algn="l">
+              <a:spcBef>
+                <a:spcPts val="1200"/>
+              </a:spcBef>
+              <a:spcAft>
+                <a:spcPts val="0"/>
+              </a:spcAft>
+              <a:buSzPts val="1800"/>
+              <a:buChar char="●"/>
+            </a:pPr>
+            <a:r>
+              <a:rPr lang="en"/>
+              <a:t>Since cost effectiveness is a design goal, the system is designed to work on free or inexpensive cloud servers, and use serverless technologies so that costs are incurred only when the system is in use</a:t>
+            </a:r>
+            <a:endParaRPr/>
+          </a:p>
+          <a:p>
+            <a:pPr indent="-342900" lvl="0" marL="457200" rtl="0" algn="l">
+              <a:spcBef>
+                <a:spcPts val="0"/>
+              </a:spcBef>
+              <a:spcAft>
+                <a:spcPts val="0"/>
+              </a:spcAft>
+              <a:buSzPts val="1800"/>
+              <a:buChar char="●"/>
+            </a:pPr>
+            <a:r>
+              <a:rPr lang="en"/>
+              <a:t>Since widespread device support is a design goal, the system is built as a web application that works on any phone, tablet or computer</a:t>
+            </a:r>
+            <a:endParaRPr/>
+          </a:p>
+          <a:p>
+            <a:pPr indent="0" lvl="0" marL="0" rtl="0" algn="l">
+              <a:spcBef>
+                <a:spcPts val="1200"/>
+              </a:spcBef>
+              <a:spcAft>
+                <a:spcPts val="0"/>
+              </a:spcAft>
+              <a:buNone/>
+            </a:pPr>
+            <a:r>
+              <a:rPr lang="en"/>
+              <a:t>Known Issues</a:t>
+            </a:r>
+            <a:endParaRPr/>
+          </a:p>
+          <a:p>
+            <a:pPr indent="-342900" lvl="0" marL="457200" rtl="0" algn="l">
+              <a:spcBef>
+                <a:spcPts val="1200"/>
+              </a:spcBef>
+              <a:spcAft>
+                <a:spcPts val="0"/>
+              </a:spcAft>
+              <a:buSzPts val="1800"/>
+              <a:buChar char="●"/>
+            </a:pPr>
+            <a:r>
+              <a:rPr lang="en"/>
+              <a:t>None at this time</a:t>
             </a:r>
             <a:endParaRPr/>
           </a:p>

</xml_diff>